<commit_message>
Carol Fan May 8 pre-class commits for work over weekend
</commit_message>
<xml_diff>
--- a/final-project/1/DS-SF-34_Final_Project_Part1_Carol_Fan_7May2017.pptx
+++ b/final-project/1/DS-SF-34_Final_Project_Part1_Carol_Fan_7May2017.pptx
@@ -470,6 +470,248 @@
 </file>
 
 <file path=ppt/notesSlides/notesSlide1.xml><?xml version="1.0" encoding="utf-8"?>
+<p:notes xmlns:a="http://schemas.openxmlformats.org/drawingml/2006/main" xmlns:r="http://schemas.openxmlformats.org/officeDocument/2006/relationships" xmlns:p="http://schemas.openxmlformats.org/presentationml/2006/main">
+  <p:cSld>
+    <p:spTree>
+      <p:nvGrpSpPr>
+        <p:cNvPr id="1" name=""/>
+        <p:cNvGrpSpPr/>
+        <p:nvPr/>
+      </p:nvGrpSpPr>
+      <p:grpSpPr>
+        <a:xfrm>
+          <a:off x="0" y="0"/>
+          <a:ext cx="0" cy="0"/>
+          <a:chOff x="0" y="0"/>
+          <a:chExt cx="0" cy="0"/>
+        </a:xfrm>
+      </p:grpSpPr>
+      <p:sp>
+        <p:nvSpPr>
+          <p:cNvPr id="2" name="Slide Image Placeholder 1"/>
+          <p:cNvSpPr>
+            <a:spLocks noGrp="1" noRot="1" noChangeAspect="1"/>
+          </p:cNvSpPr>
+          <p:nvPr>
+            <p:ph type="sldImg"/>
+          </p:nvPr>
+        </p:nvSpPr>
+        <p:spPr/>
+      </p:sp>
+      <p:sp>
+        <p:nvSpPr>
+          <p:cNvPr id="3" name="Notes Placeholder 2"/>
+          <p:cNvSpPr>
+            <a:spLocks noGrp="1"/>
+          </p:cNvSpPr>
+          <p:nvPr>
+            <p:ph type="body" idx="1"/>
+          </p:nvPr>
+        </p:nvSpPr>
+        <p:spPr/>
+        <p:txBody>
+          <a:bodyPr/>
+          <a:lstStyle/>
+          <a:p>
+            <a:r>
+              <a:rPr lang="mr-IN" dirty="0" smtClean="0"/>
+              <a:t>print df['has_zero'].sum() </a:t>
+            </a:r>
+          </a:p>
+          <a:p>
+            <a:r>
+              <a:rPr lang="mr-IN" dirty="0" smtClean="0"/>
+              <a:t>   #675</a:t>
+            </a:r>
+            <a:r>
+              <a:rPr lang="en-US" dirty="0" smtClean="0"/>
+              <a:t>  good for lunch</a:t>
+            </a:r>
+            <a:endParaRPr lang="mr-IN" dirty="0" smtClean="0"/>
+          </a:p>
+          <a:p>
+            <a:r>
+              <a:rPr lang="mr-IN" dirty="0" smtClean="0"/>
+              <a:t>print df['has_one'].sum() </a:t>
+            </a:r>
+          </a:p>
+          <a:p>
+            <a:r>
+              <a:rPr lang="mr-IN" dirty="0" smtClean="0"/>
+              <a:t>    #997</a:t>
+            </a:r>
+            <a:r>
+              <a:rPr lang="en-US" dirty="0" smtClean="0"/>
+              <a:t>  good for dinner</a:t>
+            </a:r>
+            <a:endParaRPr lang="mr-IN" dirty="0" smtClean="0"/>
+          </a:p>
+          <a:p>
+            <a:r>
+              <a:rPr lang="mr-IN" dirty="0" smtClean="0"/>
+              <a:t>print df['has_two'].sum()  </a:t>
+            </a:r>
+          </a:p>
+          <a:p>
+            <a:r>
+              <a:rPr lang="mr-IN" dirty="0" smtClean="0"/>
+              <a:t>     #1030</a:t>
+            </a:r>
+            <a:r>
+              <a:rPr lang="en-US" dirty="0" smtClean="0"/>
+              <a:t> takes reservations</a:t>
+            </a:r>
+            <a:endParaRPr lang="mr-IN" dirty="0" smtClean="0"/>
+          </a:p>
+          <a:p>
+            <a:r>
+              <a:rPr lang="mr-IN" dirty="0" smtClean="0"/>
+              <a:t>print df['has_three'].sum() </a:t>
+            </a:r>
+          </a:p>
+          <a:p>
+            <a:r>
+              <a:rPr lang="mr-IN" dirty="0" smtClean="0"/>
+              <a:t>     #1007</a:t>
+            </a:r>
+            <a:r>
+              <a:rPr lang="en-US" dirty="0" smtClean="0"/>
+              <a:t> outdoor seating</a:t>
+            </a:r>
+            <a:endParaRPr lang="mr-IN" dirty="0" smtClean="0"/>
+          </a:p>
+          <a:p>
+            <a:r>
+              <a:rPr lang="mr-IN" dirty="0" smtClean="0"/>
+              <a:t>print df['has_four'].sum() </a:t>
+            </a:r>
+          </a:p>
+          <a:p>
+            <a:r>
+              <a:rPr lang="mr-IN" dirty="0" smtClean="0"/>
+              <a:t>  # 551</a:t>
+            </a:r>
+            <a:r>
+              <a:rPr lang="en-US" dirty="0" smtClean="0"/>
+              <a:t>  restaurant</a:t>
+            </a:r>
+            <a:r>
+              <a:rPr lang="en-US" baseline="0" dirty="0" smtClean="0"/>
+              <a:t> is expensive</a:t>
+            </a:r>
+            <a:endParaRPr lang="mr-IN" dirty="0" smtClean="0"/>
+          </a:p>
+          <a:p>
+            <a:r>
+              <a:rPr lang="mr-IN" dirty="0" smtClean="0"/>
+              <a:t>print df['has_five'].sum() </a:t>
+            </a:r>
+          </a:p>
+          <a:p>
+            <a:r>
+              <a:rPr lang="mr-IN" dirty="0" smtClean="0"/>
+              <a:t>   # 1253</a:t>
+            </a:r>
+            <a:r>
+              <a:rPr lang="en-US" dirty="0" smtClean="0"/>
+              <a:t>  has alcohol</a:t>
+            </a:r>
+            <a:endParaRPr lang="mr-IN" dirty="0" smtClean="0"/>
+          </a:p>
+          <a:p>
+            <a:r>
+              <a:rPr lang="mr-IN" dirty="0" smtClean="0"/>
+              <a:t>print df['has_six’].sum() </a:t>
+            </a:r>
+          </a:p>
+          <a:p>
+            <a:r>
+              <a:rPr lang="mr-IN" dirty="0" smtClean="0"/>
+              <a:t>    #1364</a:t>
+            </a:r>
+            <a:r>
+              <a:rPr lang="en-US" dirty="0" smtClean="0"/>
+              <a:t>  has table service</a:t>
+            </a:r>
+            <a:endParaRPr lang="mr-IN" dirty="0" smtClean="0"/>
+          </a:p>
+          <a:p>
+            <a:r>
+              <a:rPr lang="mr-IN" dirty="0" smtClean="0"/>
+              <a:t>print df['has_seven'].sum() </a:t>
+            </a:r>
+          </a:p>
+          <a:p>
+            <a:r>
+              <a:rPr lang="mr-IN" dirty="0" smtClean="0"/>
+              <a:t>   # 576</a:t>
+            </a:r>
+            <a:r>
+              <a:rPr lang="en-US" dirty="0" smtClean="0"/>
+              <a:t>   ambience</a:t>
+            </a:r>
+            <a:r>
+              <a:rPr lang="en-US" baseline="0" dirty="0" smtClean="0"/>
+              <a:t> is classy</a:t>
+            </a:r>
+            <a:endParaRPr lang="mr-IN" dirty="0" smtClean="0"/>
+          </a:p>
+          <a:p>
+            <a:r>
+              <a:rPr lang="mr-IN" dirty="0" smtClean="0"/>
+              <a:t>print df['has_eight'].sum() </a:t>
+            </a:r>
+          </a:p>
+          <a:p>
+            <a:r>
+              <a:rPr lang="mr-IN" dirty="0" smtClean="0"/>
+              <a:t>   # 1242</a:t>
+            </a:r>
+            <a:r>
+              <a:rPr lang="en-US" dirty="0" smtClean="0"/>
+              <a:t>  good for kids</a:t>
+            </a:r>
+            <a:endParaRPr lang="en-US" dirty="0"/>
+          </a:p>
+        </p:txBody>
+      </p:sp>
+      <p:sp>
+        <p:nvSpPr>
+          <p:cNvPr id="4" name="Slide Number Placeholder 3"/>
+          <p:cNvSpPr>
+            <a:spLocks noGrp="1"/>
+          </p:cNvSpPr>
+          <p:nvPr>
+            <p:ph type="sldNum" sz="quarter" idx="10"/>
+          </p:nvPr>
+        </p:nvSpPr>
+        <p:spPr/>
+        <p:txBody>
+          <a:bodyPr/>
+          <a:lstStyle/>
+          <a:p>
+            <a:fld id="{5DEF4762-B6CD-4E44-8151-0A2AAE0FBB72}" type="slidenum">
+              <a:rPr lang="en-US" smtClean="0"/>
+              <a:t>9</a:t>
+            </a:fld>
+            <a:endParaRPr lang="en-US"/>
+          </a:p>
+        </p:txBody>
+      </p:sp>
+    </p:spTree>
+    <p:extLst>
+      <p:ext uri="{BB962C8B-B14F-4D97-AF65-F5344CB8AC3E}">
+        <p14:creationId xmlns:p14="http://schemas.microsoft.com/office/powerpoint/2010/main" val="3086921637"/>
+      </p:ext>
+    </p:extLst>
+  </p:cSld>
+  <p:clrMapOvr>
+    <a:masterClrMapping/>
+  </p:clrMapOvr>
+</p:notes>
+</file>
+
+<file path=ppt/notesSlides/notesSlide2.xml><?xml version="1.0" encoding="utf-8"?>
 <p:notes xmlns:a="http://schemas.openxmlformats.org/drawingml/2006/main" xmlns:r="http://schemas.openxmlformats.org/officeDocument/2006/relationships" xmlns:p="http://schemas.openxmlformats.org/presentationml/2006/main">
   <p:cSld>
     <p:spTree>
@@ -4577,7 +4819,7 @@
           <a:p>
             <a:r>
               <a:rPr lang="en-US" dirty="0" smtClean="0">
-                <a:hlinkClick r:id="rId2"/>
+                <a:hlinkClick r:id="rId3"/>
               </a:rPr>
               <a:t>https://www.kaggle.com/c/yelp-restaurant-photo-classification/data</a:t>
             </a:r>
@@ -4593,7 +4835,7 @@
             <a:pPr lvl="1"/>
             <a:r>
               <a:rPr lang="en-US" dirty="0" smtClean="0"/>
-              <a:t>Restaurant and its associated photos (uploaded by restaurant and users)</a:t>
+              <a:t>2001 Restaurants and 235K associated photos (uploaded by restaurant and users)</a:t>
             </a:r>
           </a:p>
           <a:p>

</xml_diff>

<commit_message>
Carol Fan work during May 15 class
</commit_message>
<xml_diff>
--- a/final-project/1/DS-SF-34_Final_Project_Part1_Carol_Fan_7May2017.pptx
+++ b/final-project/1/DS-SF-34_Final_Project_Part1_Carol_Fan_7May2017.pptx
@@ -513,6 +513,90 @@
           <a:bodyPr/>
           <a:lstStyle/>
           <a:p>
+            <a:endParaRPr lang="en-US" dirty="0"/>
+          </a:p>
+        </p:txBody>
+      </p:sp>
+      <p:sp>
+        <p:nvSpPr>
+          <p:cNvPr id="4" name="Slide Number Placeholder 3"/>
+          <p:cNvSpPr>
+            <a:spLocks noGrp="1"/>
+          </p:cNvSpPr>
+          <p:nvPr>
+            <p:ph type="sldNum" sz="quarter" idx="10"/>
+          </p:nvPr>
+        </p:nvSpPr>
+        <p:spPr/>
+        <p:txBody>
+          <a:bodyPr/>
+          <a:lstStyle/>
+          <a:p>
+            <a:fld id="{5DEF4762-B6CD-4E44-8151-0A2AAE0FBB72}" type="slidenum">
+              <a:rPr lang="en-US" smtClean="0"/>
+              <a:t>1</a:t>
+            </a:fld>
+            <a:endParaRPr lang="en-US"/>
+          </a:p>
+        </p:txBody>
+      </p:sp>
+    </p:spTree>
+    <p:extLst>
+      <p:ext uri="{BB962C8B-B14F-4D97-AF65-F5344CB8AC3E}">
+        <p14:creationId xmlns:p14="http://schemas.microsoft.com/office/powerpoint/2010/main" val="2166379729"/>
+      </p:ext>
+    </p:extLst>
+  </p:cSld>
+  <p:clrMapOvr>
+    <a:masterClrMapping/>
+  </p:clrMapOvr>
+</p:notes>
+</file>
+
+<file path=ppt/notesSlides/notesSlide2.xml><?xml version="1.0" encoding="utf-8"?>
+<p:notes xmlns:a="http://schemas.openxmlformats.org/drawingml/2006/main" xmlns:r="http://schemas.openxmlformats.org/officeDocument/2006/relationships" xmlns:p="http://schemas.openxmlformats.org/presentationml/2006/main">
+  <p:cSld>
+    <p:spTree>
+      <p:nvGrpSpPr>
+        <p:cNvPr id="1" name=""/>
+        <p:cNvGrpSpPr/>
+        <p:nvPr/>
+      </p:nvGrpSpPr>
+      <p:grpSpPr>
+        <a:xfrm>
+          <a:off x="0" y="0"/>
+          <a:ext cx="0" cy="0"/>
+          <a:chOff x="0" y="0"/>
+          <a:chExt cx="0" cy="0"/>
+        </a:xfrm>
+      </p:grpSpPr>
+      <p:sp>
+        <p:nvSpPr>
+          <p:cNvPr id="2" name="Slide Image Placeholder 1"/>
+          <p:cNvSpPr>
+            <a:spLocks noGrp="1" noRot="1" noChangeAspect="1"/>
+          </p:cNvSpPr>
+          <p:nvPr>
+            <p:ph type="sldImg"/>
+          </p:nvPr>
+        </p:nvSpPr>
+        <p:spPr/>
+      </p:sp>
+      <p:sp>
+        <p:nvSpPr>
+          <p:cNvPr id="3" name="Notes Placeholder 2"/>
+          <p:cNvSpPr>
+            <a:spLocks noGrp="1"/>
+          </p:cNvSpPr>
+          <p:nvPr>
+            <p:ph type="body" idx="1"/>
+          </p:nvPr>
+        </p:nvSpPr>
+        <p:spPr/>
+        <p:txBody>
+          <a:bodyPr/>
+          <a:lstStyle/>
+          <a:p>
             <a:r>
               <a:rPr lang="mr-IN" dirty="0" smtClean="0"/>
               <a:t>print df['has_zero'].sum() </a:t>
@@ -711,7 +795,7 @@
 </p:notes>
 </file>
 
-<file path=ppt/notesSlides/notesSlide2.xml><?xml version="1.0" encoding="utf-8"?>
+<file path=ppt/notesSlides/notesSlide3.xml><?xml version="1.0" encoding="utf-8"?>
 <p:notes xmlns:a="http://schemas.openxmlformats.org/drawingml/2006/main" xmlns:r="http://schemas.openxmlformats.org/officeDocument/2006/relationships" xmlns:p="http://schemas.openxmlformats.org/presentationml/2006/main">
   <p:cSld>
     <p:spTree>

</xml_diff>